<commit_message>
removed 1week break from term 1
</commit_message>
<xml_diff>
--- a/program_at_a_glance_with_breaks_revised.pptx
+++ b/program_at_a_glance_with_breaks_revised.pptx
@@ -12,15 +12,6 @@
   </p:sldIdLst>
   <p:sldSz cx="10799763" cy="6858000"/>
   <p:notesSz cx="6858000" cy="9144000"/>
-  <p:embeddedFontLst>
-    <p:embeddedFont>
-      <p:font typeface="Calibri" panose="020F0502020204030204" pitchFamily="34" charset="0"/>
-      <p:regular r:id="rId4"/>
-      <p:bold r:id="rId5"/>
-      <p:italic r:id="rId6"/>
-      <p:boldItalic r:id="rId7"/>
-    </p:embeddedFont>
-  </p:embeddedFontLst>
   <p:defaultTextStyle>
     <a:defPPr marR="0" algn="l" rtl="0">
       <a:lnSpc>
@@ -234,7 +225,7 @@
   </p:defaultTextStyle>
   <p:extLst>
     <p:ext uri="{EFAFB233-063F-42B5-8137-9DF3F51BA10A}">
-      <p15:sldGuideLst xmlns:p15="http://schemas.microsoft.com/office/powerpoint/2012/main">
+      <p15:sldGuideLst xmlns:p15="http://schemas.microsoft.com/office/powerpoint/2012/main" xmlns="">
         <p15:guide id="1" orient="horz" pos="2160">
           <p15:clr>
             <a:srgbClr val="A4A3A4"/>
@@ -7571,7 +7562,7 @@
         </p:nvGraphicFramePr>
         <p:xfrm>
           <a:off x="186265" y="333593"/>
-          <a:ext cx="2023525" cy="1859310"/>
+          <a:ext cx="2023525" cy="1859309"/>
         </p:xfrm>
         <a:graphic>
           <a:graphicData uri="http://schemas.openxmlformats.org/drawingml/2006/table">
@@ -7584,7 +7575,7 @@
                 <a:gridCol w="2023525">
                   <a:extLst>
                     <a:ext uri="{9D8B030D-6E8A-4147-A177-3AD203B41FA5}">
-                      <a16:colId xmlns:a16="http://schemas.microsoft.com/office/drawing/2014/main" val="20000"/>
+                      <a16:colId xmlns:a16="http://schemas.microsoft.com/office/drawing/2014/main" xmlns="" val="20000"/>
                     </a:ext>
                   </a:extLst>
                 </a:gridCol>
@@ -7612,7 +7603,7 @@
                 </a:tc>
                 <a:extLst>
                   <a:ext uri="{0D108BD9-81ED-4DB2-BD59-A6C34878D82A}">
-                    <a16:rowId xmlns:a16="http://schemas.microsoft.com/office/drawing/2014/main" val="10000"/>
+                    <a16:rowId xmlns:a16="http://schemas.microsoft.com/office/drawing/2014/main" xmlns="" val="10000"/>
                   </a:ext>
                 </a:extLst>
               </a:tr>
@@ -7643,7 +7634,7 @@
                 </a:tc>
                 <a:extLst>
                   <a:ext uri="{0D108BD9-81ED-4DB2-BD59-A6C34878D82A}">
-                    <a16:rowId xmlns:a16="http://schemas.microsoft.com/office/drawing/2014/main" val="10001"/>
+                    <a16:rowId xmlns:a16="http://schemas.microsoft.com/office/drawing/2014/main" xmlns="" val="10001"/>
                   </a:ext>
                 </a:extLst>
               </a:tr>
@@ -7678,7 +7669,7 @@
                 </a:tc>
                 <a:extLst>
                   <a:ext uri="{0D108BD9-81ED-4DB2-BD59-A6C34878D82A}">
-                    <a16:rowId xmlns:a16="http://schemas.microsoft.com/office/drawing/2014/main" val="10002"/>
+                    <a16:rowId xmlns:a16="http://schemas.microsoft.com/office/drawing/2014/main" xmlns="" val="10002"/>
                   </a:ext>
                 </a:extLst>
               </a:tr>
@@ -7700,7 +7691,7 @@
         </p:nvGraphicFramePr>
         <p:xfrm>
           <a:off x="2370669" y="333593"/>
-          <a:ext cx="2218275" cy="2895650"/>
+          <a:ext cx="2218275" cy="2895649"/>
         </p:xfrm>
         <a:graphic>
           <a:graphicData uri="http://schemas.openxmlformats.org/drawingml/2006/table">
@@ -7713,7 +7704,7 @@
                 <a:gridCol w="2218275">
                   <a:extLst>
                     <a:ext uri="{9D8B030D-6E8A-4147-A177-3AD203B41FA5}">
-                      <a16:colId xmlns:a16="http://schemas.microsoft.com/office/drawing/2014/main" val="20000"/>
+                      <a16:colId xmlns:a16="http://schemas.microsoft.com/office/drawing/2014/main" xmlns="" val="20000"/>
                     </a:ext>
                   </a:extLst>
                 </a:gridCol>
@@ -7741,7 +7732,7 @@
                 </a:tc>
                 <a:extLst>
                   <a:ext uri="{0D108BD9-81ED-4DB2-BD59-A6C34878D82A}">
-                    <a16:rowId xmlns:a16="http://schemas.microsoft.com/office/drawing/2014/main" val="10000"/>
+                    <a16:rowId xmlns:a16="http://schemas.microsoft.com/office/drawing/2014/main" xmlns="" val="10000"/>
                   </a:ext>
                 </a:extLst>
               </a:tr>
@@ -7768,7 +7759,7 @@
                 </a:tc>
                 <a:extLst>
                   <a:ext uri="{0D108BD9-81ED-4DB2-BD59-A6C34878D82A}">
-                    <a16:rowId xmlns:a16="http://schemas.microsoft.com/office/drawing/2014/main" val="10001"/>
+                    <a16:rowId xmlns:a16="http://schemas.microsoft.com/office/drawing/2014/main" xmlns="" val="10001"/>
                   </a:ext>
                 </a:extLst>
               </a:tr>
@@ -7816,7 +7807,7 @@
                 </a:tc>
                 <a:extLst>
                   <a:ext uri="{0D108BD9-81ED-4DB2-BD59-A6C34878D82A}">
-                    <a16:rowId xmlns:a16="http://schemas.microsoft.com/office/drawing/2014/main" val="10002"/>
+                    <a16:rowId xmlns:a16="http://schemas.microsoft.com/office/drawing/2014/main" xmlns="" val="10002"/>
                   </a:ext>
                 </a:extLst>
               </a:tr>
@@ -7865,7 +7856,7 @@
                 </a:tc>
                 <a:extLst>
                   <a:ext uri="{0D108BD9-81ED-4DB2-BD59-A6C34878D82A}">
-                    <a16:rowId xmlns:a16="http://schemas.microsoft.com/office/drawing/2014/main" val="10003"/>
+                    <a16:rowId xmlns:a16="http://schemas.microsoft.com/office/drawing/2014/main" xmlns="" val="10003"/>
                   </a:ext>
                 </a:extLst>
               </a:tr>
@@ -7892,7 +7883,7 @@
                 </a:tc>
                 <a:extLst>
                   <a:ext uri="{0D108BD9-81ED-4DB2-BD59-A6C34878D82A}">
-                    <a16:rowId xmlns:a16="http://schemas.microsoft.com/office/drawing/2014/main" val="10004"/>
+                    <a16:rowId xmlns:a16="http://schemas.microsoft.com/office/drawing/2014/main" xmlns="" val="10004"/>
                   </a:ext>
                 </a:extLst>
               </a:tr>
@@ -7907,14 +7898,14 @@
           <p:nvPr>
             <p:extLst>
               <p:ext uri="{D42A27DB-BD31-4B8C-83A1-F6EECF244321}">
-                <p14:modId xmlns:p14="http://schemas.microsoft.com/office/powerpoint/2010/main" val="2328704922"/>
+                <p14:modId xmlns:p14="http://schemas.microsoft.com/office/powerpoint/2010/main" val="2257967618"/>
               </p:ext>
             </p:extLst>
           </p:nvPr>
         </p:nvGraphicFramePr>
         <p:xfrm>
-          <a:off x="6339126" y="356419"/>
-          <a:ext cx="1973150" cy="1859310"/>
+          <a:off x="4749485" y="356419"/>
+          <a:ext cx="1973150" cy="1859309"/>
         </p:xfrm>
         <a:graphic>
           <a:graphicData uri="http://schemas.openxmlformats.org/drawingml/2006/table">
@@ -7927,7 +7918,7 @@
                 <a:gridCol w="1973150">
                   <a:extLst>
                     <a:ext uri="{9D8B030D-6E8A-4147-A177-3AD203B41FA5}">
-                      <a16:colId xmlns:a16="http://schemas.microsoft.com/office/drawing/2014/main" val="20000"/>
+                      <a16:colId xmlns:a16="http://schemas.microsoft.com/office/drawing/2014/main" xmlns="" val="20000"/>
                     </a:ext>
                   </a:extLst>
                 </a:gridCol>
@@ -7955,7 +7946,7 @@
                 </a:tc>
                 <a:extLst>
                   <a:ext uri="{0D108BD9-81ED-4DB2-BD59-A6C34878D82A}">
-                    <a16:rowId xmlns:a16="http://schemas.microsoft.com/office/drawing/2014/main" val="10000"/>
+                    <a16:rowId xmlns:a16="http://schemas.microsoft.com/office/drawing/2014/main" xmlns="" val="10000"/>
                   </a:ext>
                 </a:extLst>
               </a:tr>
@@ -7987,7 +7978,7 @@
                 </a:tc>
                 <a:extLst>
                   <a:ext uri="{0D108BD9-81ED-4DB2-BD59-A6C34878D82A}">
-                    <a16:rowId xmlns:a16="http://schemas.microsoft.com/office/drawing/2014/main" val="10001"/>
+                    <a16:rowId xmlns:a16="http://schemas.microsoft.com/office/drawing/2014/main" xmlns="" val="10001"/>
                   </a:ext>
                 </a:extLst>
               </a:tr>
@@ -8031,7 +8022,7 @@
                 </a:tc>
                 <a:extLst>
                   <a:ext uri="{0D108BD9-81ED-4DB2-BD59-A6C34878D82A}">
-                    <a16:rowId xmlns:a16="http://schemas.microsoft.com/office/drawing/2014/main" val="10002"/>
+                    <a16:rowId xmlns:a16="http://schemas.microsoft.com/office/drawing/2014/main" xmlns="" val="10002"/>
                   </a:ext>
                 </a:extLst>
               </a:tr>
@@ -8046,14 +8037,14 @@
           <p:nvPr>
             <p:extLst>
               <p:ext uri="{D42A27DB-BD31-4B8C-83A1-F6EECF244321}">
-                <p14:modId xmlns:p14="http://schemas.microsoft.com/office/powerpoint/2010/main" val="2029536633"/>
+                <p14:modId xmlns:p14="http://schemas.microsoft.com/office/powerpoint/2010/main" val="3803245760"/>
               </p:ext>
             </p:extLst>
           </p:nvPr>
         </p:nvGraphicFramePr>
         <p:xfrm>
-          <a:off x="8489526" y="333593"/>
-          <a:ext cx="2198597" cy="2534970"/>
+          <a:off x="6899885" y="333593"/>
+          <a:ext cx="2198597" cy="2748329"/>
         </p:xfrm>
         <a:graphic>
           <a:graphicData uri="http://schemas.openxmlformats.org/drawingml/2006/table">
@@ -8066,7 +8057,7 @@
                 <a:gridCol w="2198597">
                   <a:extLst>
                     <a:ext uri="{9D8B030D-6E8A-4147-A177-3AD203B41FA5}">
-                      <a16:colId xmlns:a16="http://schemas.microsoft.com/office/drawing/2014/main" val="20000"/>
+                      <a16:colId xmlns:a16="http://schemas.microsoft.com/office/drawing/2014/main" xmlns="" val="20000"/>
                     </a:ext>
                   </a:extLst>
                 </a:gridCol>
@@ -8094,7 +8085,7 @@
                 </a:tc>
                 <a:extLst>
                   <a:ext uri="{0D108BD9-81ED-4DB2-BD59-A6C34878D82A}">
-                    <a16:rowId xmlns:a16="http://schemas.microsoft.com/office/drawing/2014/main" val="10000"/>
+                    <a16:rowId xmlns:a16="http://schemas.microsoft.com/office/drawing/2014/main" xmlns="" val="10000"/>
                   </a:ext>
                 </a:extLst>
               </a:tr>
@@ -8150,7 +8141,7 @@
                 </a:tc>
                 <a:extLst>
                   <a:ext uri="{0D108BD9-81ED-4DB2-BD59-A6C34878D82A}">
-                    <a16:rowId xmlns:a16="http://schemas.microsoft.com/office/drawing/2014/main" val="10001"/>
+                    <a16:rowId xmlns:a16="http://schemas.microsoft.com/office/drawing/2014/main" xmlns="" val="10001"/>
                   </a:ext>
                 </a:extLst>
               </a:tr>
@@ -8181,7 +8172,7 @@
                 </a:tc>
                 <a:extLst>
                   <a:ext uri="{0D108BD9-81ED-4DB2-BD59-A6C34878D82A}">
-                    <a16:rowId xmlns:a16="http://schemas.microsoft.com/office/drawing/2014/main" val="10002"/>
+                    <a16:rowId xmlns:a16="http://schemas.microsoft.com/office/drawing/2014/main" xmlns="" val="10002"/>
                   </a:ext>
                 </a:extLst>
               </a:tr>
@@ -8229,7 +8220,7 @@
                 </a:tc>
                 <a:extLst>
                   <a:ext uri="{0D108BD9-81ED-4DB2-BD59-A6C34878D82A}">
-                    <a16:rowId xmlns:a16="http://schemas.microsoft.com/office/drawing/2014/main" val="10003"/>
+                    <a16:rowId xmlns:a16="http://schemas.microsoft.com/office/drawing/2014/main" xmlns="" val="10003"/>
                   </a:ext>
                 </a:extLst>
               </a:tr>
@@ -8256,7 +8247,7 @@
                 </a:tc>
                 <a:extLst>
                   <a:ext uri="{0D108BD9-81ED-4DB2-BD59-A6C34878D82A}">
-                    <a16:rowId xmlns:a16="http://schemas.microsoft.com/office/drawing/2014/main" val="10004"/>
+                    <a16:rowId xmlns:a16="http://schemas.microsoft.com/office/drawing/2014/main" xmlns="" val="10004"/>
                   </a:ext>
                 </a:extLst>
               </a:tr>
@@ -8278,7 +8269,7 @@
         </p:nvGraphicFramePr>
         <p:xfrm>
           <a:off x="101603" y="3479672"/>
-          <a:ext cx="2136900" cy="2682290"/>
+          <a:ext cx="2136900" cy="2682289"/>
         </p:xfrm>
         <a:graphic>
           <a:graphicData uri="http://schemas.openxmlformats.org/drawingml/2006/table">
@@ -8291,7 +8282,7 @@
                 <a:gridCol w="2136900">
                   <a:extLst>
                     <a:ext uri="{9D8B030D-6E8A-4147-A177-3AD203B41FA5}">
-                      <a16:colId xmlns:a16="http://schemas.microsoft.com/office/drawing/2014/main" val="20000"/>
+                      <a16:colId xmlns:a16="http://schemas.microsoft.com/office/drawing/2014/main" xmlns="" val="20000"/>
                     </a:ext>
                   </a:extLst>
                 </a:gridCol>
@@ -8319,7 +8310,7 @@
                 </a:tc>
                 <a:extLst>
                   <a:ext uri="{0D108BD9-81ED-4DB2-BD59-A6C34878D82A}">
-                    <a16:rowId xmlns:a16="http://schemas.microsoft.com/office/drawing/2014/main" val="10000"/>
+                    <a16:rowId xmlns:a16="http://schemas.microsoft.com/office/drawing/2014/main" xmlns="" val="10000"/>
                   </a:ext>
                 </a:extLst>
               </a:tr>
@@ -8346,7 +8337,7 @@
                 </a:tc>
                 <a:extLst>
                   <a:ext uri="{0D108BD9-81ED-4DB2-BD59-A6C34878D82A}">
-                    <a16:rowId xmlns:a16="http://schemas.microsoft.com/office/drawing/2014/main" val="10001"/>
+                    <a16:rowId xmlns:a16="http://schemas.microsoft.com/office/drawing/2014/main" xmlns="" val="10001"/>
                   </a:ext>
                 </a:extLst>
               </a:tr>
@@ -8378,7 +8369,7 @@
                 </a:tc>
                 <a:extLst>
                   <a:ext uri="{0D108BD9-81ED-4DB2-BD59-A6C34878D82A}">
-                    <a16:rowId xmlns:a16="http://schemas.microsoft.com/office/drawing/2014/main" val="10002"/>
+                    <a16:rowId xmlns:a16="http://schemas.microsoft.com/office/drawing/2014/main" xmlns="" val="10002"/>
                   </a:ext>
                 </a:extLst>
               </a:tr>
@@ -8426,7 +8417,7 @@
                 </a:tc>
                 <a:extLst>
                   <a:ext uri="{0D108BD9-81ED-4DB2-BD59-A6C34878D82A}">
-                    <a16:rowId xmlns:a16="http://schemas.microsoft.com/office/drawing/2014/main" val="10003"/>
+                    <a16:rowId xmlns:a16="http://schemas.microsoft.com/office/drawing/2014/main" xmlns="" val="10003"/>
                   </a:ext>
                 </a:extLst>
               </a:tr>
@@ -8470,7 +8461,7 @@
                 </a:tc>
                 <a:extLst>
                   <a:ext uri="{0D108BD9-81ED-4DB2-BD59-A6C34878D82A}">
-                    <a16:rowId xmlns:a16="http://schemas.microsoft.com/office/drawing/2014/main" val="10004"/>
+                    <a16:rowId xmlns:a16="http://schemas.microsoft.com/office/drawing/2014/main" xmlns="" val="10004"/>
                   </a:ext>
                 </a:extLst>
               </a:tr>
@@ -8492,7 +8483,7 @@
         </p:nvGraphicFramePr>
         <p:xfrm>
           <a:off x="2406169" y="3479672"/>
-          <a:ext cx="2175650" cy="2651810"/>
+          <a:ext cx="2175650" cy="2834689"/>
         </p:xfrm>
         <a:graphic>
           <a:graphicData uri="http://schemas.openxmlformats.org/drawingml/2006/table">
@@ -8505,7 +8496,7 @@
                 <a:gridCol w="2175650">
                   <a:extLst>
                     <a:ext uri="{9D8B030D-6E8A-4147-A177-3AD203B41FA5}">
-                      <a16:colId xmlns:a16="http://schemas.microsoft.com/office/drawing/2014/main" val="20000"/>
+                      <a16:colId xmlns:a16="http://schemas.microsoft.com/office/drawing/2014/main" xmlns="" val="20000"/>
                     </a:ext>
                   </a:extLst>
                 </a:gridCol>
@@ -8559,7 +8550,7 @@
                 </a:tc>
                 <a:extLst>
                   <a:ext uri="{0D108BD9-81ED-4DB2-BD59-A6C34878D82A}">
-                    <a16:rowId xmlns:a16="http://schemas.microsoft.com/office/drawing/2014/main" val="10000"/>
+                    <a16:rowId xmlns:a16="http://schemas.microsoft.com/office/drawing/2014/main" xmlns="" val="10000"/>
                   </a:ext>
                 </a:extLst>
               </a:tr>
@@ -8586,7 +8577,7 @@
                 </a:tc>
                 <a:extLst>
                   <a:ext uri="{0D108BD9-81ED-4DB2-BD59-A6C34878D82A}">
-                    <a16:rowId xmlns:a16="http://schemas.microsoft.com/office/drawing/2014/main" val="10001"/>
+                    <a16:rowId xmlns:a16="http://schemas.microsoft.com/office/drawing/2014/main" xmlns="" val="10001"/>
                   </a:ext>
                 </a:extLst>
               </a:tr>
@@ -8613,7 +8604,7 @@
                 </a:tc>
                 <a:extLst>
                   <a:ext uri="{0D108BD9-81ED-4DB2-BD59-A6C34878D82A}">
-                    <a16:rowId xmlns:a16="http://schemas.microsoft.com/office/drawing/2014/main" val="10002"/>
+                    <a16:rowId xmlns:a16="http://schemas.microsoft.com/office/drawing/2014/main" xmlns="" val="10002"/>
                   </a:ext>
                 </a:extLst>
               </a:tr>
@@ -8657,7 +8648,7 @@
                 </a:tc>
                 <a:extLst>
                   <a:ext uri="{0D108BD9-81ED-4DB2-BD59-A6C34878D82A}">
-                    <a16:rowId xmlns:a16="http://schemas.microsoft.com/office/drawing/2014/main" val="10003"/>
+                    <a16:rowId xmlns:a16="http://schemas.microsoft.com/office/drawing/2014/main" xmlns="" val="10003"/>
                   </a:ext>
                 </a:extLst>
               </a:tr>
@@ -8688,7 +8679,7 @@
                 </a:tc>
                 <a:extLst>
                   <a:ext uri="{0D108BD9-81ED-4DB2-BD59-A6C34878D82A}">
-                    <a16:rowId xmlns:a16="http://schemas.microsoft.com/office/drawing/2014/main" val="10004"/>
+                    <a16:rowId xmlns:a16="http://schemas.microsoft.com/office/drawing/2014/main" xmlns="" val="10004"/>
                   </a:ext>
                 </a:extLst>
               </a:tr>
@@ -8710,7 +8701,7 @@
         </p:nvGraphicFramePr>
         <p:xfrm>
           <a:off x="6899885" y="3508498"/>
-          <a:ext cx="2201465" cy="914420"/>
+          <a:ext cx="2201465" cy="914419"/>
         </p:xfrm>
         <a:graphic>
           <a:graphicData uri="http://schemas.openxmlformats.org/drawingml/2006/table">
@@ -8723,7 +8714,7 @@
                 <a:gridCol w="2201465">
                   <a:extLst>
                     <a:ext uri="{9D8B030D-6E8A-4147-A177-3AD203B41FA5}">
-                      <a16:colId xmlns:a16="http://schemas.microsoft.com/office/drawing/2014/main" val="20000"/>
+                      <a16:colId xmlns:a16="http://schemas.microsoft.com/office/drawing/2014/main" xmlns="" val="20000"/>
                     </a:ext>
                   </a:extLst>
                 </a:gridCol>
@@ -8751,7 +8742,7 @@
                 </a:tc>
                 <a:extLst>
                   <a:ext uri="{0D108BD9-81ED-4DB2-BD59-A6C34878D82A}">
-                    <a16:rowId xmlns:a16="http://schemas.microsoft.com/office/drawing/2014/main" val="10000"/>
+                    <a16:rowId xmlns:a16="http://schemas.microsoft.com/office/drawing/2014/main" xmlns="" val="10000"/>
                   </a:ext>
                 </a:extLst>
               </a:tr>
@@ -8799,7 +8790,7 @@
                 </a:tc>
                 <a:extLst>
                   <a:ext uri="{0D108BD9-81ED-4DB2-BD59-A6C34878D82A}">
-                    <a16:rowId xmlns:a16="http://schemas.microsoft.com/office/drawing/2014/main" val="10001"/>
+                    <a16:rowId xmlns:a16="http://schemas.microsoft.com/office/drawing/2014/main" xmlns="" val="10001"/>
                   </a:ext>
                 </a:extLst>
               </a:tr>
@@ -8834,28 +8825,28 @@
                 <a:gridCol w="390100">
                   <a:extLst>
                     <a:ext uri="{9D8B030D-6E8A-4147-A177-3AD203B41FA5}">
-                      <a16:colId xmlns:a16="http://schemas.microsoft.com/office/drawing/2014/main" val="20000"/>
+                      <a16:colId xmlns:a16="http://schemas.microsoft.com/office/drawing/2014/main" xmlns="" val="20000"/>
                     </a:ext>
                   </a:extLst>
                 </a:gridCol>
                 <a:gridCol w="413900">
                   <a:extLst>
                     <a:ext uri="{9D8B030D-6E8A-4147-A177-3AD203B41FA5}">
-                      <a16:colId xmlns:a16="http://schemas.microsoft.com/office/drawing/2014/main" val="20001"/>
+                      <a16:colId xmlns:a16="http://schemas.microsoft.com/office/drawing/2014/main" xmlns="" val="20001"/>
                     </a:ext>
                   </a:extLst>
                 </a:gridCol>
                 <a:gridCol w="382900">
                   <a:extLst>
                     <a:ext uri="{9D8B030D-6E8A-4147-A177-3AD203B41FA5}">
-                      <a16:colId xmlns:a16="http://schemas.microsoft.com/office/drawing/2014/main" val="20002"/>
+                      <a16:colId xmlns:a16="http://schemas.microsoft.com/office/drawing/2014/main" xmlns="" val="20002"/>
                     </a:ext>
                   </a:extLst>
                 </a:gridCol>
                 <a:gridCol w="478300">
                   <a:extLst>
                     <a:ext uri="{9D8B030D-6E8A-4147-A177-3AD203B41FA5}">
-                      <a16:colId xmlns:a16="http://schemas.microsoft.com/office/drawing/2014/main" val="20003"/>
+                      <a16:colId xmlns:a16="http://schemas.microsoft.com/office/drawing/2014/main" xmlns="" val="20003"/>
                     </a:ext>
                   </a:extLst>
                 </a:gridCol>
@@ -8943,7 +8934,7 @@
                 </a:tc>
                 <a:extLst>
                   <a:ext uri="{0D108BD9-81ED-4DB2-BD59-A6C34878D82A}">
-                    <a16:rowId xmlns:a16="http://schemas.microsoft.com/office/drawing/2014/main" val="10000"/>
+                    <a16:rowId xmlns:a16="http://schemas.microsoft.com/office/drawing/2014/main" xmlns="" val="10000"/>
                   </a:ext>
                 </a:extLst>
               </a:tr>
@@ -9030,7 +9021,7 @@
                 </a:tc>
                 <a:extLst>
                   <a:ext uri="{0D108BD9-81ED-4DB2-BD59-A6C34878D82A}">
-                    <a16:rowId xmlns:a16="http://schemas.microsoft.com/office/drawing/2014/main" val="10001"/>
+                    <a16:rowId xmlns:a16="http://schemas.microsoft.com/office/drawing/2014/main" xmlns="" val="10001"/>
                   </a:ext>
                 </a:extLst>
               </a:tr>
@@ -9117,7 +9108,7 @@
                 </a:tc>
                 <a:extLst>
                   <a:ext uri="{0D108BD9-81ED-4DB2-BD59-A6C34878D82A}">
-                    <a16:rowId xmlns:a16="http://schemas.microsoft.com/office/drawing/2014/main" val="10002"/>
+                    <a16:rowId xmlns:a16="http://schemas.microsoft.com/office/drawing/2014/main" xmlns="" val="10002"/>
                   </a:ext>
                 </a:extLst>
               </a:tr>
@@ -9219,28 +9210,28 @@
                 <a:gridCol w="397775">
                   <a:extLst>
                     <a:ext uri="{9D8B030D-6E8A-4147-A177-3AD203B41FA5}">
-                      <a16:colId xmlns:a16="http://schemas.microsoft.com/office/drawing/2014/main" val="20000"/>
+                      <a16:colId xmlns:a16="http://schemas.microsoft.com/office/drawing/2014/main" xmlns="" val="20000"/>
                     </a:ext>
                   </a:extLst>
                 </a:gridCol>
                 <a:gridCol w="382900">
                   <a:extLst>
                     <a:ext uri="{9D8B030D-6E8A-4147-A177-3AD203B41FA5}">
-                      <a16:colId xmlns:a16="http://schemas.microsoft.com/office/drawing/2014/main" val="20001"/>
+                      <a16:colId xmlns:a16="http://schemas.microsoft.com/office/drawing/2014/main" xmlns="" val="20001"/>
                     </a:ext>
                   </a:extLst>
                 </a:gridCol>
                 <a:gridCol w="382900">
                   <a:extLst>
                     <a:ext uri="{9D8B030D-6E8A-4147-A177-3AD203B41FA5}">
-                      <a16:colId xmlns:a16="http://schemas.microsoft.com/office/drawing/2014/main" val="20002"/>
+                      <a16:colId xmlns:a16="http://schemas.microsoft.com/office/drawing/2014/main" xmlns="" val="20002"/>
                     </a:ext>
                   </a:extLst>
                 </a:gridCol>
                 <a:gridCol w="481375">
                   <a:extLst>
                     <a:ext uri="{9D8B030D-6E8A-4147-A177-3AD203B41FA5}">
-                      <a16:colId xmlns:a16="http://schemas.microsoft.com/office/drawing/2014/main" val="20003"/>
+                      <a16:colId xmlns:a16="http://schemas.microsoft.com/office/drawing/2014/main" xmlns="" val="20003"/>
                     </a:ext>
                   </a:extLst>
                 </a:gridCol>
@@ -9299,7 +9290,7 @@
                         <a:buNone/>
                       </a:pPr>
                       <a:r>
-                        <a:rPr lang="en-US" sz="1800" b="1" u="none" strike="noStrike" cap="none" baseline="0"/>
+                        <a:rPr lang="en-US" sz="1800" b="1" u="none" strike="noStrike" cap="none" baseline="0" dirty="0"/>
                         <a:t>W</a:t>
                       </a:r>
                     </a:p>
@@ -9328,7 +9319,7 @@
                 </a:tc>
                 <a:extLst>
                   <a:ext uri="{0D108BD9-81ED-4DB2-BD59-A6C34878D82A}">
-                    <a16:rowId xmlns:a16="http://schemas.microsoft.com/office/drawing/2014/main" val="10000"/>
+                    <a16:rowId xmlns:a16="http://schemas.microsoft.com/office/drawing/2014/main" xmlns="" val="10000"/>
                   </a:ext>
                 </a:extLst>
               </a:tr>
@@ -9415,7 +9406,7 @@
                 </a:tc>
                 <a:extLst>
                   <a:ext uri="{0D108BD9-81ED-4DB2-BD59-A6C34878D82A}">
-                    <a16:rowId xmlns:a16="http://schemas.microsoft.com/office/drawing/2014/main" val="10001"/>
+                    <a16:rowId xmlns:a16="http://schemas.microsoft.com/office/drawing/2014/main" xmlns="" val="10001"/>
                   </a:ext>
                 </a:extLst>
               </a:tr>
@@ -9502,7 +9493,7 @@
                 </a:tc>
                 <a:extLst>
                   <a:ext uri="{0D108BD9-81ED-4DB2-BD59-A6C34878D82A}">
-                    <a16:rowId xmlns:a16="http://schemas.microsoft.com/office/drawing/2014/main" val="10002"/>
+                    <a16:rowId xmlns:a16="http://schemas.microsoft.com/office/drawing/2014/main" xmlns="" val="10002"/>
                   </a:ext>
                 </a:extLst>
               </a:tr>
@@ -9524,7 +9515,7 @@
         </p:nvGraphicFramePr>
         <p:xfrm>
           <a:off x="4749485" y="3486413"/>
-          <a:ext cx="2001300" cy="2895650"/>
+          <a:ext cx="2001300" cy="3109009"/>
         </p:xfrm>
         <a:graphic>
           <a:graphicData uri="http://schemas.openxmlformats.org/drawingml/2006/table">
@@ -9537,7 +9528,7 @@
                 <a:gridCol w="2001300">
                   <a:extLst>
                     <a:ext uri="{9D8B030D-6E8A-4147-A177-3AD203B41FA5}">
-                      <a16:colId xmlns:a16="http://schemas.microsoft.com/office/drawing/2014/main" val="20000"/>
+                      <a16:colId xmlns:a16="http://schemas.microsoft.com/office/drawing/2014/main" xmlns="" val="20000"/>
                     </a:ext>
                   </a:extLst>
                 </a:gridCol>
@@ -9565,7 +9556,7 @@
                 </a:tc>
                 <a:extLst>
                   <a:ext uri="{0D108BD9-81ED-4DB2-BD59-A6C34878D82A}">
-                    <a16:rowId xmlns:a16="http://schemas.microsoft.com/office/drawing/2014/main" val="10000"/>
+                    <a16:rowId xmlns:a16="http://schemas.microsoft.com/office/drawing/2014/main" xmlns="" val="10000"/>
                   </a:ext>
                 </a:extLst>
               </a:tr>
@@ -9609,7 +9600,7 @@
                 </a:tc>
                 <a:extLst>
                   <a:ext uri="{0D108BD9-81ED-4DB2-BD59-A6C34878D82A}">
-                    <a16:rowId xmlns:a16="http://schemas.microsoft.com/office/drawing/2014/main" val="10001"/>
+                    <a16:rowId xmlns:a16="http://schemas.microsoft.com/office/drawing/2014/main" xmlns="" val="10001"/>
                   </a:ext>
                 </a:extLst>
               </a:tr>
@@ -9653,7 +9644,7 @@
                 </a:tc>
                 <a:extLst>
                   <a:ext uri="{0D108BD9-81ED-4DB2-BD59-A6C34878D82A}">
-                    <a16:rowId xmlns:a16="http://schemas.microsoft.com/office/drawing/2014/main" val="10002"/>
+                    <a16:rowId xmlns:a16="http://schemas.microsoft.com/office/drawing/2014/main" xmlns="" val="10002"/>
                   </a:ext>
                 </a:extLst>
               </a:tr>
@@ -9684,7 +9675,7 @@
                 </a:tc>
                 <a:extLst>
                   <a:ext uri="{0D108BD9-81ED-4DB2-BD59-A6C34878D82A}">
-                    <a16:rowId xmlns:a16="http://schemas.microsoft.com/office/drawing/2014/main" val="10003"/>
+                    <a16:rowId xmlns:a16="http://schemas.microsoft.com/office/drawing/2014/main" xmlns="" val="10003"/>
                   </a:ext>
                 </a:extLst>
               </a:tr>
@@ -9715,120 +9706,7 @@
                 </a:tc>
                 <a:extLst>
                   <a:ext uri="{0D108BD9-81ED-4DB2-BD59-A6C34878D82A}">
-                    <a16:rowId xmlns:a16="http://schemas.microsoft.com/office/drawing/2014/main" val="10004"/>
-                  </a:ext>
-                </a:extLst>
-              </a:tr>
-            </a:tbl>
-          </a:graphicData>
-        </a:graphic>
-      </p:graphicFrame>
-      <p:graphicFrame>
-        <p:nvGraphicFramePr>
-          <p:cNvPr id="26" name="Shape 94"/>
-          <p:cNvGraphicFramePr/>
-          <p:nvPr>
-            <p:extLst>
-              <p:ext uri="{D42A27DB-BD31-4B8C-83A1-F6EECF244321}">
-                <p14:modId xmlns:p14="http://schemas.microsoft.com/office/powerpoint/2010/main" val="2693941603"/>
-              </p:ext>
-            </p:extLst>
-          </p:nvPr>
-        </p:nvGraphicFramePr>
-        <p:xfrm>
-          <a:off x="4819968" y="333593"/>
-          <a:ext cx="1324646" cy="914420"/>
-        </p:xfrm>
-        <a:graphic>
-          <a:graphicData uri="http://schemas.openxmlformats.org/drawingml/2006/table">
-            <a:tbl>
-              <a:tblPr firstRow="1" bandRow="1">
-                <a:noFill/>
-                <a:tableStyleId>{E422A848-1BDF-4489-91D1-30B8065C2DBB}</a:tableStyleId>
-              </a:tblPr>
-              <a:tblGrid>
-                <a:gridCol w="1324646">
-                  <a:extLst>
-                    <a:ext uri="{9D8B030D-6E8A-4147-A177-3AD203B41FA5}">
-                      <a16:colId xmlns:a16="http://schemas.microsoft.com/office/drawing/2014/main" val="20000"/>
-                    </a:ext>
-                  </a:extLst>
-                </a:gridCol>
-              </a:tblGrid>
-              <a:tr h="370850">
-                <a:tc>
-                  <a:txBody>
-                    <a:bodyPr/>
-                    <a:lstStyle/>
-                    <a:p>
-                      <a:pPr marL="0" marR="0" lvl="0" indent="0" algn="l" rtl="0">
-                        <a:spcBef>
-                          <a:spcPts val="0"/>
-                        </a:spcBef>
-                        <a:buSzPct val="25000"/>
-                        <a:buNone/>
-                      </a:pPr>
-                      <a:r>
-                        <a:rPr lang="en-US" sz="2000" b="1" u="none" strike="noStrike" cap="none" baseline="0" dirty="0" smtClean="0"/>
-                        <a:t>1 week</a:t>
-                      </a:r>
-                      <a:endParaRPr lang="en-US" sz="2000" b="1" u="none" strike="noStrike" cap="none" baseline="0" dirty="0"/>
-                    </a:p>
-                  </a:txBody>
-                  <a:tcPr marL="91450" marR="91450" marT="45725" marB="45725"/>
-                </a:tc>
-                <a:extLst>
-                  <a:ext uri="{0D108BD9-81ED-4DB2-BD59-A6C34878D82A}">
-                    <a16:rowId xmlns:a16="http://schemas.microsoft.com/office/drawing/2014/main" val="10000"/>
-                  </a:ext>
-                </a:extLst>
-              </a:tr>
-              <a:tr h="370850">
-                <a:tc>
-                  <a:txBody>
-                    <a:bodyPr/>
-                    <a:lstStyle/>
-                    <a:p>
-                      <a:pPr lvl="0" rtl="0">
-                        <a:spcBef>
-                          <a:spcPts val="0"/>
-                        </a:spcBef>
-                        <a:buClr>
-                          <a:schemeClr val="dk1"/>
-                        </a:buClr>
-                        <a:buSzPct val="25000"/>
-                        <a:buFont typeface="Arial"/>
-                        <a:buNone/>
-                      </a:pPr>
-                      <a:r>
-                        <a:rPr lang="en-US" b="1" dirty="0" smtClean="0"/>
-                        <a:t>Break </a:t>
-                      </a:r>
-                    </a:p>
-                    <a:p>
-                      <a:pPr lvl="0" rtl="0">
-                        <a:spcBef>
-                          <a:spcPts val="0"/>
-                        </a:spcBef>
-                        <a:buClr>
-                          <a:schemeClr val="dk1"/>
-                        </a:buClr>
-                        <a:buSzPct val="25000"/>
-                        <a:buFont typeface="Arial"/>
-                        <a:buNone/>
-                      </a:pPr>
-                      <a:r>
-                        <a:rPr lang="en-US" b="1" dirty="0" smtClean="0"/>
-                        <a:t>(no classes)</a:t>
-                      </a:r>
-                      <a:endParaRPr lang="en-US" b="1" dirty="0"/>
-                    </a:p>
-                  </a:txBody>
-                  <a:tcPr marL="91450" marR="91450" marT="45725" marB="45725"/>
-                </a:tc>
-                <a:extLst>
-                  <a:ext uri="{0D108BD9-81ED-4DB2-BD59-A6C34878D82A}">
-                    <a16:rowId xmlns:a16="http://schemas.microsoft.com/office/drawing/2014/main" val="10001"/>
+                    <a16:rowId xmlns:a16="http://schemas.microsoft.com/office/drawing/2014/main" xmlns="" val="10004"/>
                   </a:ext>
                 </a:extLst>
               </a:tr>
@@ -9841,7 +9719,7 @@
   <p:clrMapOvr>
     <a:masterClrMapping/>
   </p:clrMapOvr>
-  <p:transition spd="slow">
+  <p:transition xmlns:p14="http://schemas.microsoft.com/office/powerpoint/2010/main" spd="slow">
     <p:cut/>
   </p:transition>
 </p:sld>

</xml_diff>